<commit_message>
changed B2/S23 to B3/S23
</commit_message>
<xml_diff>
--- a/presentation/ConwayGameOfLife.pptx
+++ b/presentation/ConwayGameOfLife.pptx
@@ -7327,7 +7327,15 @@
           <a:p>
             <a:r>
               <a:rPr lang="en-US" dirty="0" smtClean="0"/>
-              <a:t>Conway Rules (B2/S23)</a:t>
+              <a:t>Conway Rules </a:t>
+            </a:r>
+            <a:r>
+              <a:rPr lang="en-US" smtClean="0"/>
+              <a:t>(B3/S23</a:t>
+            </a:r>
+            <a:r>
+              <a:rPr lang="en-US" dirty="0" smtClean="0"/>
+              <a:t>)</a:t>
             </a:r>
             <a:endParaRPr lang="en-US" dirty="0"/>
           </a:p>

</xml_diff>